<commit_message>
Adding final week quiz
</commit_message>
<xml_diff>
--- a/PPTs/Week9.pptx
+++ b/PPTs/Week9.pptx
@@ -467,7 +467,7 @@
           <a:p>
             <a:fld id="{911D48D3-D9A0-44A7-B806-1FECC2308CB0}" type="datetimeFigureOut">
               <a:rPr lang="en-CA" smtClean="0"/>
-              <a:t>2022-08-18</a:t>
+              <a:t>2022-08-24</a:t>
             </a:fld>
             <a:endParaRPr lang="en-CA"/>
           </a:p>
@@ -1555,7 +1555,7 @@
           <a:p>
             <a:fld id="{911D48D3-D9A0-44A7-B806-1FECC2308CB0}" type="datetimeFigureOut">
               <a:rPr lang="en-CA" smtClean="0"/>
-              <a:t>2022-08-18</a:t>
+              <a:t>2022-08-24</a:t>
             </a:fld>
             <a:endParaRPr lang="en-CA"/>
           </a:p>
@@ -2535,7 +2535,7 @@
           <a:p>
             <a:fld id="{911D48D3-D9A0-44A7-B806-1FECC2308CB0}" type="datetimeFigureOut">
               <a:rPr lang="en-CA" smtClean="0"/>
-              <a:t>2022-08-18</a:t>
+              <a:t>2022-08-24</a:t>
             </a:fld>
             <a:endParaRPr lang="en-CA"/>
           </a:p>
@@ -3669,7 +3669,7 @@
           <a:p>
             <a:fld id="{911D48D3-D9A0-44A7-B806-1FECC2308CB0}" type="datetimeFigureOut">
               <a:rPr lang="en-CA" smtClean="0"/>
-              <a:t>2022-08-18</a:t>
+              <a:t>2022-08-24</a:t>
             </a:fld>
             <a:endParaRPr lang="en-CA"/>
           </a:p>
@@ -4702,7 +4702,7 @@
           <a:p>
             <a:fld id="{911D48D3-D9A0-44A7-B806-1FECC2308CB0}" type="datetimeFigureOut">
               <a:rPr lang="en-CA" smtClean="0"/>
-              <a:t>2022-08-18</a:t>
+              <a:t>2022-08-24</a:t>
             </a:fld>
             <a:endParaRPr lang="en-CA"/>
           </a:p>
@@ -5362,7 +5362,7 @@
           <a:p>
             <a:fld id="{911D48D3-D9A0-44A7-B806-1FECC2308CB0}" type="datetimeFigureOut">
               <a:rPr lang="en-CA" smtClean="0"/>
-              <a:t>2022-08-18</a:t>
+              <a:t>2022-08-24</a:t>
             </a:fld>
             <a:endParaRPr lang="en-CA"/>
           </a:p>
@@ -6223,7 +6223,7 @@
           <a:p>
             <a:fld id="{911D48D3-D9A0-44A7-B806-1FECC2308CB0}" type="datetimeFigureOut">
               <a:rPr lang="en-CA" smtClean="0"/>
-              <a:t>2022-08-18</a:t>
+              <a:t>2022-08-24</a:t>
             </a:fld>
             <a:endParaRPr lang="en-CA"/>
           </a:p>
@@ -6413,7 +6413,7 @@
           <a:p>
             <a:fld id="{911D48D3-D9A0-44A7-B806-1FECC2308CB0}" type="datetimeFigureOut">
               <a:rPr lang="en-CA" smtClean="0"/>
-              <a:t>2022-08-18</a:t>
+              <a:t>2022-08-24</a:t>
             </a:fld>
             <a:endParaRPr lang="en-CA"/>
           </a:p>
@@ -7385,7 +7385,7 @@
           <a:p>
             <a:fld id="{911D48D3-D9A0-44A7-B806-1FECC2308CB0}" type="datetimeFigureOut">
               <a:rPr lang="en-CA" smtClean="0"/>
-              <a:t>2022-08-18</a:t>
+              <a:t>2022-08-24</a:t>
             </a:fld>
             <a:endParaRPr lang="en-CA"/>
           </a:p>
@@ -7596,7 +7596,7 @@
           <a:p>
             <a:fld id="{911D48D3-D9A0-44A7-B806-1FECC2308CB0}" type="datetimeFigureOut">
               <a:rPr lang="en-CA" smtClean="0"/>
-              <a:t>2022-08-18</a:t>
+              <a:t>2022-08-24</a:t>
             </a:fld>
             <a:endParaRPr lang="en-CA"/>
           </a:p>
@@ -8630,7 +8630,7 @@
           <a:p>
             <a:fld id="{911D48D3-D9A0-44A7-B806-1FECC2308CB0}" type="datetimeFigureOut">
               <a:rPr lang="en-CA" smtClean="0"/>
-              <a:t>2022-08-18</a:t>
+              <a:t>2022-08-24</a:t>
             </a:fld>
             <a:endParaRPr lang="en-CA"/>
           </a:p>
@@ -8902,7 +8902,7 @@
           <a:p>
             <a:fld id="{911D48D3-D9A0-44A7-B806-1FECC2308CB0}" type="datetimeFigureOut">
               <a:rPr lang="en-CA" smtClean="0"/>
-              <a:t>2022-08-18</a:t>
+              <a:t>2022-08-24</a:t>
             </a:fld>
             <a:endParaRPr lang="en-CA"/>
           </a:p>
@@ -9312,7 +9312,7 @@
           <a:p>
             <a:fld id="{911D48D3-D9A0-44A7-B806-1FECC2308CB0}" type="datetimeFigureOut">
               <a:rPr lang="en-CA" smtClean="0"/>
-              <a:t>2022-08-18</a:t>
+              <a:t>2022-08-24</a:t>
             </a:fld>
             <a:endParaRPr lang="en-CA"/>
           </a:p>
@@ -9439,7 +9439,7 @@
           <a:p>
             <a:fld id="{911D48D3-D9A0-44A7-B806-1FECC2308CB0}" type="datetimeFigureOut">
               <a:rPr lang="en-CA" smtClean="0"/>
-              <a:t>2022-08-18</a:t>
+              <a:t>2022-08-24</a:t>
             </a:fld>
             <a:endParaRPr lang="en-CA"/>
           </a:p>
@@ -9534,7 +9534,7 @@
           <a:p>
             <a:fld id="{911D48D3-D9A0-44A7-B806-1FECC2308CB0}" type="datetimeFigureOut">
               <a:rPr lang="en-CA" smtClean="0"/>
-              <a:t>2022-08-18</a:t>
+              <a:t>2022-08-24</a:t>
             </a:fld>
             <a:endParaRPr lang="en-CA"/>
           </a:p>
@@ -10615,7 +10615,7 @@
           <a:p>
             <a:fld id="{911D48D3-D9A0-44A7-B806-1FECC2308CB0}" type="datetimeFigureOut">
               <a:rPr lang="en-CA" smtClean="0"/>
-              <a:t>2022-08-18</a:t>
+              <a:t>2022-08-24</a:t>
             </a:fld>
             <a:endParaRPr lang="en-CA"/>
           </a:p>
@@ -11723,7 +11723,7 @@
           <a:p>
             <a:fld id="{911D48D3-D9A0-44A7-B806-1FECC2308CB0}" type="datetimeFigureOut">
               <a:rPr lang="en-CA" smtClean="0"/>
-              <a:t>2022-08-18</a:t>
+              <a:t>2022-08-24</a:t>
             </a:fld>
             <a:endParaRPr lang="en-CA"/>
           </a:p>
@@ -12720,7 +12720,7 @@
           <a:p>
             <a:fld id="{911D48D3-D9A0-44A7-B806-1FECC2308CB0}" type="datetimeFigureOut">
               <a:rPr lang="en-CA" smtClean="0"/>
-              <a:t>2022-08-18</a:t>
+              <a:t>2022-08-24</a:t>
             </a:fld>
             <a:endParaRPr lang="en-CA"/>
           </a:p>
@@ -13314,7 +13314,7 @@
                   <a:schemeClr val="bg1"/>
                 </a:solidFill>
               </a:rPr>
-              <a:t>PYTHON CRASH COURSE WEEK 6</a:t>
+              <a:t>PYTHON CRASH COURSE WEEK 9</a:t>
             </a:r>
             <a:endParaRPr lang="en-CA" b="1" dirty="0">
               <a:solidFill>
@@ -13354,10 +13354,10 @@
           <a:p>
             <a:pPr algn="ctr"/>
             <a:r>
-              <a:rPr lang="en-US" sz="2000"/>
+              <a:rPr lang="en-US" sz="2000" dirty="0"/>
               <a:t>Summer 2022</a:t>
             </a:r>
-            <a:endParaRPr lang="en-CA" sz="2000"/>
+            <a:endParaRPr lang="en-CA" sz="2000" dirty="0"/>
           </a:p>
         </p:txBody>
       </p:sp>
@@ -13739,7 +13739,7 @@
             </a:pPr>
             <a:r>
               <a:rPr lang="en-US" sz="2000" dirty="0"/>
-              <a:t>The “try” statement allows you to ask the computer to try running a piece of code that is potentially faulty/bugged/liable to raising an error</a:t>
+              <a:t>The “try” statement allows you to ask the computer to try running a piece of code that is potentially faulty/bugged/contains an error</a:t>
             </a:r>
           </a:p>
           <a:p>

</xml_diff>